<commit_message>
atulizações no site v5
</commit_message>
<xml_diff>
--- a/site recife slide.pptx
+++ b/site recife slide.pptx
@@ -871,7 +871,7 @@
             <a:fld id="{3C2B07E4-CDF9-4C88-A2F3-04620E58224D}" type="datetimeFigureOut">
               <a:rPr lang="en-US" smtClean="0"/>
               <a:pPr/>
-              <a:t>12/4/2022</a:t>
+              <a:t>12/5/2022</a:t>
             </a:fld>
             <a:endParaRPr lang="en-US" dirty="0"/>
           </a:p>
@@ -930,6 +930,18 @@
   <p:clrMapOvr>
     <a:masterClrMapping/>
   </p:clrMapOvr>
+  <mc:AlternateContent xmlns:mc="http://schemas.openxmlformats.org/markup-compatibility/2006">
+    <mc:Choice xmlns:p159="http://schemas.microsoft.com/office/powerpoint/2015/09/main" Requires="p159">
+      <p:transition spd="slow" advTm="23">
+        <p159:morph option="byObject"/>
+      </p:transition>
+    </mc:Choice>
+    <mc:Fallback>
+      <p:transition spd="slow" advTm="23">
+        <p:fade/>
+      </p:transition>
+    </mc:Fallback>
+  </mc:AlternateContent>
 </p:sldLayout>
 </file>
 
@@ -1124,7 +1136,7 @@
             <a:fld id="{3C2B07E4-CDF9-4C88-A2F3-04620E58224D}" type="datetimeFigureOut">
               <a:rPr lang="en-US" smtClean="0"/>
               <a:pPr/>
-              <a:t>12/4/2022</a:t>
+              <a:t>12/5/2022</a:t>
             </a:fld>
             <a:endParaRPr lang="en-US" dirty="0"/>
           </a:p>
@@ -1183,6 +1195,18 @@
   <p:clrMapOvr>
     <a:masterClrMapping/>
   </p:clrMapOvr>
+  <mc:AlternateContent xmlns:mc="http://schemas.openxmlformats.org/markup-compatibility/2006">
+    <mc:Choice xmlns:p159="http://schemas.microsoft.com/office/powerpoint/2015/09/main" Requires="p159">
+      <p:transition spd="slow" advTm="23">
+        <p159:morph option="byObject"/>
+      </p:transition>
+    </mc:Choice>
+    <mc:Fallback>
+      <p:transition spd="slow" advTm="23">
+        <p:fade/>
+      </p:transition>
+    </mc:Fallback>
+  </mc:AlternateContent>
 </p:sldLayout>
 </file>
 
@@ -1440,7 +1464,7 @@
             <a:fld id="{3C2B07E4-CDF9-4C88-A2F3-04620E58224D}" type="datetimeFigureOut">
               <a:rPr lang="en-US" smtClean="0"/>
               <a:pPr/>
-              <a:t>12/4/2022</a:t>
+              <a:t>12/5/2022</a:t>
             </a:fld>
             <a:endParaRPr lang="en-US" dirty="0"/>
           </a:p>
@@ -1581,6 +1605,18 @@
   <p:clrMapOvr>
     <a:masterClrMapping/>
   </p:clrMapOvr>
+  <mc:AlternateContent xmlns:mc="http://schemas.openxmlformats.org/markup-compatibility/2006">
+    <mc:Choice xmlns:p159="http://schemas.microsoft.com/office/powerpoint/2015/09/main" Requires="p159">
+      <p:transition spd="slow" advTm="23">
+        <p159:morph option="byObject"/>
+      </p:transition>
+    </mc:Choice>
+    <mc:Fallback>
+      <p:transition spd="slow" advTm="23">
+        <p:fade/>
+      </p:transition>
+    </mc:Fallback>
+  </mc:AlternateContent>
 </p:sldLayout>
 </file>
 
@@ -1775,7 +1811,7 @@
             <a:fld id="{3C2B07E4-CDF9-4C88-A2F3-04620E58224D}" type="datetimeFigureOut">
               <a:rPr lang="en-US" smtClean="0"/>
               <a:pPr/>
-              <a:t>12/4/2022</a:t>
+              <a:t>12/5/2022</a:t>
             </a:fld>
             <a:endParaRPr lang="en-US" dirty="0"/>
           </a:p>
@@ -1834,6 +1870,18 @@
   <p:clrMapOvr>
     <a:masterClrMapping/>
   </p:clrMapOvr>
+  <mc:AlternateContent xmlns:mc="http://schemas.openxmlformats.org/markup-compatibility/2006">
+    <mc:Choice xmlns:p159="http://schemas.microsoft.com/office/powerpoint/2015/09/main" Requires="p159">
+      <p:transition spd="slow" advTm="23">
+        <p159:morph option="byObject"/>
+      </p:transition>
+    </mc:Choice>
+    <mc:Fallback>
+      <p:transition spd="slow" advTm="23">
+        <p:fade/>
+      </p:transition>
+    </mc:Fallback>
+  </mc:AlternateContent>
 </p:sldLayout>
 </file>
 
@@ -2091,7 +2139,7 @@
             <a:fld id="{3C2B07E4-CDF9-4C88-A2F3-04620E58224D}" type="datetimeFigureOut">
               <a:rPr lang="en-US" smtClean="0"/>
               <a:pPr/>
-              <a:t>12/4/2022</a:t>
+              <a:t>12/5/2022</a:t>
             </a:fld>
             <a:endParaRPr lang="en-US" dirty="0"/>
           </a:p>
@@ -2232,6 +2280,18 @@
   <p:clrMapOvr>
     <a:masterClrMapping/>
   </p:clrMapOvr>
+  <mc:AlternateContent xmlns:mc="http://schemas.openxmlformats.org/markup-compatibility/2006">
+    <mc:Choice xmlns:p159="http://schemas.microsoft.com/office/powerpoint/2015/09/main" Requires="p159">
+      <p:transition spd="slow" advTm="23">
+        <p159:morph option="byObject"/>
+      </p:transition>
+    </mc:Choice>
+    <mc:Fallback>
+      <p:transition spd="slow" advTm="23">
+        <p:fade/>
+      </p:transition>
+    </mc:Fallback>
+  </mc:AlternateContent>
 </p:sldLayout>
 </file>
 
@@ -2486,7 +2546,7 @@
             <a:fld id="{3C2B07E4-CDF9-4C88-A2F3-04620E58224D}" type="datetimeFigureOut">
               <a:rPr lang="en-US" smtClean="0"/>
               <a:pPr/>
-              <a:t>12/4/2022</a:t>
+              <a:t>12/5/2022</a:t>
             </a:fld>
             <a:endParaRPr lang="en-US" dirty="0"/>
           </a:p>
@@ -2545,6 +2605,18 @@
   <p:clrMapOvr>
     <a:masterClrMapping/>
   </p:clrMapOvr>
+  <mc:AlternateContent xmlns:mc="http://schemas.openxmlformats.org/markup-compatibility/2006">
+    <mc:Choice xmlns:p159="http://schemas.microsoft.com/office/powerpoint/2015/09/main" Requires="p159">
+      <p:transition spd="slow" advTm="23">
+        <p159:morph option="byObject"/>
+      </p:transition>
+    </mc:Choice>
+    <mc:Fallback>
+      <p:transition spd="slow" advTm="23">
+        <p:fade/>
+      </p:transition>
+    </mc:Fallback>
+  </mc:AlternateContent>
 </p:sldLayout>
 </file>
 
@@ -2658,7 +2730,7 @@
             <a:fld id="{3C2B07E4-CDF9-4C88-A2F3-04620E58224D}" type="datetimeFigureOut">
               <a:rPr lang="en-US" smtClean="0"/>
               <a:pPr/>
-              <a:t>12/4/2022</a:t>
+              <a:t>12/5/2022</a:t>
             </a:fld>
             <a:endParaRPr lang="en-US" dirty="0"/>
           </a:p>
@@ -2717,6 +2789,18 @@
   <p:clrMapOvr>
     <a:masterClrMapping/>
   </p:clrMapOvr>
+  <mc:AlternateContent xmlns:mc="http://schemas.openxmlformats.org/markup-compatibility/2006">
+    <mc:Choice xmlns:p159="http://schemas.microsoft.com/office/powerpoint/2015/09/main" Requires="p159">
+      <p:transition spd="slow" advTm="23">
+        <p159:morph option="byObject"/>
+      </p:transition>
+    </mc:Choice>
+    <mc:Fallback>
+      <p:transition spd="slow" advTm="23">
+        <p:fade/>
+      </p:transition>
+    </mc:Fallback>
+  </mc:AlternateContent>
 </p:sldLayout>
 </file>
 
@@ -2840,7 +2924,7 @@
             <a:fld id="{3C2B07E4-CDF9-4C88-A2F3-04620E58224D}" type="datetimeFigureOut">
               <a:rPr lang="en-US" smtClean="0"/>
               <a:pPr/>
-              <a:t>12/4/2022</a:t>
+              <a:t>12/5/2022</a:t>
             </a:fld>
             <a:endParaRPr lang="en-US" dirty="0"/>
           </a:p>
@@ -2899,6 +2983,18 @@
   <p:clrMapOvr>
     <a:masterClrMapping/>
   </p:clrMapOvr>
+  <mc:AlternateContent xmlns:mc="http://schemas.openxmlformats.org/markup-compatibility/2006">
+    <mc:Choice xmlns:p159="http://schemas.microsoft.com/office/powerpoint/2015/09/main" Requires="p159">
+      <p:transition spd="slow" advTm="23">
+        <p159:morph option="byObject"/>
+      </p:transition>
+    </mc:Choice>
+    <mc:Fallback>
+      <p:transition spd="slow" advTm="23">
+        <p:fade/>
+      </p:transition>
+    </mc:Fallback>
+  </mc:AlternateContent>
 </p:sldLayout>
 </file>
 
@@ -3012,7 +3108,7 @@
             <a:fld id="{3C2B07E4-CDF9-4C88-A2F3-04620E58224D}" type="datetimeFigureOut">
               <a:rPr lang="en-US" smtClean="0"/>
               <a:pPr/>
-              <a:t>12/4/2022</a:t>
+              <a:t>12/5/2022</a:t>
             </a:fld>
             <a:endParaRPr lang="en-US" dirty="0"/>
           </a:p>
@@ -3071,6 +3167,18 @@
   <p:clrMapOvr>
     <a:masterClrMapping/>
   </p:clrMapOvr>
+  <mc:AlternateContent xmlns:mc="http://schemas.openxmlformats.org/markup-compatibility/2006">
+    <mc:Choice xmlns:p159="http://schemas.microsoft.com/office/powerpoint/2015/09/main" Requires="p159">
+      <p:transition spd="slow" advTm="23">
+        <p159:morph option="byObject"/>
+      </p:transition>
+    </mc:Choice>
+    <mc:Fallback>
+      <p:transition spd="slow" advTm="23">
+        <p:fade/>
+      </p:transition>
+    </mc:Fallback>
+  </mc:AlternateContent>
 </p:sldLayout>
 </file>
 
@@ -3261,7 +3369,7 @@
             <a:fld id="{3C2B07E4-CDF9-4C88-A2F3-04620E58224D}" type="datetimeFigureOut">
               <a:rPr lang="en-US" smtClean="0"/>
               <a:pPr/>
-              <a:t>12/4/2022</a:t>
+              <a:t>12/5/2022</a:t>
             </a:fld>
             <a:endParaRPr lang="en-US" dirty="0"/>
           </a:p>
@@ -3320,6 +3428,18 @@
   <p:clrMapOvr>
     <a:masterClrMapping/>
   </p:clrMapOvr>
+  <mc:AlternateContent xmlns:mc="http://schemas.openxmlformats.org/markup-compatibility/2006">
+    <mc:Choice xmlns:p159="http://schemas.microsoft.com/office/powerpoint/2015/09/main" Requires="p159">
+      <p:transition spd="slow" advTm="23">
+        <p159:morph option="byObject"/>
+      </p:transition>
+    </mc:Choice>
+    <mc:Fallback>
+      <p:transition spd="slow" advTm="23">
+        <p:fade/>
+      </p:transition>
+    </mc:Fallback>
+  </mc:AlternateContent>
 </p:sldLayout>
 </file>
 
@@ -3495,7 +3615,7 @@
             <a:fld id="{3C2B07E4-CDF9-4C88-A2F3-04620E58224D}" type="datetimeFigureOut">
               <a:rPr lang="en-US" smtClean="0"/>
               <a:pPr/>
-              <a:t>12/4/2022</a:t>
+              <a:t>12/5/2022</a:t>
             </a:fld>
             <a:endParaRPr lang="en-US" dirty="0"/>
           </a:p>
@@ -3554,6 +3674,18 @@
   <p:clrMapOvr>
     <a:masterClrMapping/>
   </p:clrMapOvr>
+  <mc:AlternateContent xmlns:mc="http://schemas.openxmlformats.org/markup-compatibility/2006">
+    <mc:Choice xmlns:p159="http://schemas.microsoft.com/office/powerpoint/2015/09/main" Requires="p159">
+      <p:transition spd="slow" advTm="23">
+        <p159:morph option="byObject"/>
+      </p:transition>
+    </mc:Choice>
+    <mc:Fallback>
+      <p:transition spd="slow" advTm="23">
+        <p:fade/>
+      </p:transition>
+    </mc:Fallback>
+  </mc:AlternateContent>
 </p:sldLayout>
 </file>
 
@@ -3871,7 +4003,7 @@
             <a:fld id="{3C2B07E4-CDF9-4C88-A2F3-04620E58224D}" type="datetimeFigureOut">
               <a:rPr lang="en-US" smtClean="0"/>
               <a:pPr/>
-              <a:t>12/4/2022</a:t>
+              <a:t>12/5/2022</a:t>
             </a:fld>
             <a:endParaRPr lang="en-US" dirty="0"/>
           </a:p>
@@ -3930,6 +4062,18 @@
   <p:clrMapOvr>
     <a:masterClrMapping/>
   </p:clrMapOvr>
+  <mc:AlternateContent xmlns:mc="http://schemas.openxmlformats.org/markup-compatibility/2006">
+    <mc:Choice xmlns:p159="http://schemas.microsoft.com/office/powerpoint/2015/09/main" Requires="p159">
+      <p:transition spd="slow" advTm="23">
+        <p159:morph option="byObject"/>
+      </p:transition>
+    </mc:Choice>
+    <mc:Fallback>
+      <p:transition spd="slow" advTm="23">
+        <p:fade/>
+      </p:transition>
+    </mc:Fallback>
+  </mc:AlternateContent>
 </p:sldLayout>
 </file>
 
@@ -3996,7 +4140,7 @@
             <a:fld id="{3C2B07E4-CDF9-4C88-A2F3-04620E58224D}" type="datetimeFigureOut">
               <a:rPr lang="en-US" smtClean="0"/>
               <a:pPr/>
-              <a:t>12/4/2022</a:t>
+              <a:t>12/5/2022</a:t>
             </a:fld>
             <a:endParaRPr lang="en-US" dirty="0"/>
           </a:p>
@@ -4055,6 +4199,18 @@
   <p:clrMapOvr>
     <a:masterClrMapping/>
   </p:clrMapOvr>
+  <mc:AlternateContent xmlns:mc="http://schemas.openxmlformats.org/markup-compatibility/2006">
+    <mc:Choice xmlns:p159="http://schemas.microsoft.com/office/powerpoint/2015/09/main" Requires="p159">
+      <p:transition spd="slow" advTm="23">
+        <p159:morph option="byObject"/>
+      </p:transition>
+    </mc:Choice>
+    <mc:Fallback>
+      <p:transition spd="slow" advTm="23">
+        <p:fade/>
+      </p:transition>
+    </mc:Fallback>
+  </mc:AlternateContent>
 </p:sldLayout>
 </file>
 
@@ -4093,7 +4249,7 @@
             <a:fld id="{3C2B07E4-CDF9-4C88-A2F3-04620E58224D}" type="datetimeFigureOut">
               <a:rPr lang="en-US" smtClean="0"/>
               <a:pPr/>
-              <a:t>12/4/2022</a:t>
+              <a:t>12/5/2022</a:t>
             </a:fld>
             <a:endParaRPr lang="en-US" dirty="0"/>
           </a:p>
@@ -4152,6 +4308,18 @@
   <p:clrMapOvr>
     <a:masterClrMapping/>
   </p:clrMapOvr>
+  <mc:AlternateContent xmlns:mc="http://schemas.openxmlformats.org/markup-compatibility/2006">
+    <mc:Choice xmlns:p159="http://schemas.microsoft.com/office/powerpoint/2015/09/main" Requires="p159">
+      <p:transition spd="slow" advTm="23">
+        <p159:morph option="byObject"/>
+      </p:transition>
+    </mc:Choice>
+    <mc:Fallback>
+      <p:transition spd="slow" advTm="23">
+        <p:fade/>
+      </p:transition>
+    </mc:Fallback>
+  </mc:AlternateContent>
 </p:sldLayout>
 </file>
 
@@ -4350,7 +4518,7 @@
             <a:fld id="{3C2B07E4-CDF9-4C88-A2F3-04620E58224D}" type="datetimeFigureOut">
               <a:rPr lang="en-US" smtClean="0"/>
               <a:pPr/>
-              <a:t>12/4/2022</a:t>
+              <a:t>12/5/2022</a:t>
             </a:fld>
             <a:endParaRPr lang="en-US" dirty="0"/>
           </a:p>
@@ -4409,6 +4577,18 @@
   <p:clrMapOvr>
     <a:masterClrMapping/>
   </p:clrMapOvr>
+  <mc:AlternateContent xmlns:mc="http://schemas.openxmlformats.org/markup-compatibility/2006">
+    <mc:Choice xmlns:p159="http://schemas.microsoft.com/office/powerpoint/2015/09/main" Requires="p159">
+      <p:transition spd="slow" advTm="23">
+        <p159:morph option="byObject"/>
+      </p:transition>
+    </mc:Choice>
+    <mc:Fallback>
+      <p:transition spd="slow" advTm="23">
+        <p:fade/>
+      </p:transition>
+    </mc:Fallback>
+  </mc:AlternateContent>
 </p:sldLayout>
 </file>
 
@@ -4658,7 +4838,7 @@
             <a:fld id="{3C2B07E4-CDF9-4C88-A2F3-04620E58224D}" type="datetimeFigureOut">
               <a:rPr lang="en-US" smtClean="0"/>
               <a:pPr/>
-              <a:t>12/4/2022</a:t>
+              <a:t>12/5/2022</a:t>
             </a:fld>
             <a:endParaRPr lang="en-US" dirty="0"/>
           </a:p>
@@ -4674,6 +4854,18 @@
   <p:clrMapOvr>
     <a:masterClrMapping/>
   </p:clrMapOvr>
+  <mc:AlternateContent xmlns:mc="http://schemas.openxmlformats.org/markup-compatibility/2006">
+    <mc:Choice xmlns:p159="http://schemas.microsoft.com/office/powerpoint/2015/09/main" Requires="p159">
+      <p:transition spd="slow" advTm="23">
+        <p159:morph option="byObject"/>
+      </p:transition>
+    </mc:Choice>
+    <mc:Fallback>
+      <p:transition spd="slow" advTm="23">
+        <p:fade/>
+      </p:transition>
+    </mc:Fallback>
+  </mc:AlternateContent>
 </p:sldLayout>
 </file>
 
@@ -5361,7 +5553,7 @@
             <a:fld id="{3C2B07E4-CDF9-4C88-A2F3-04620E58224D}" type="datetimeFigureOut">
               <a:rPr lang="en-US" smtClean="0"/>
               <a:pPr/>
-              <a:t>12/4/2022</a:t>
+              <a:t>12/5/2022</a:t>
             </a:fld>
             <a:endParaRPr lang="en-US" dirty="0"/>
           </a:p>
@@ -5470,6 +5662,18 @@
     <p:sldLayoutId id="2147483779" r:id="rId15"/>
     <p:sldLayoutId id="2147483780" r:id="rId16"/>
   </p:sldLayoutIdLst>
+  <mc:AlternateContent xmlns:mc="http://schemas.openxmlformats.org/markup-compatibility/2006">
+    <mc:Choice xmlns:p159="http://schemas.microsoft.com/office/powerpoint/2015/09/main" Requires="p159">
+      <p:transition spd="slow" advTm="23">
+        <p159:morph option="byObject"/>
+      </p:transition>
+    </mc:Choice>
+    <mc:Fallback>
+      <p:transition spd="slow" advTm="23">
+        <p:fade/>
+      </p:transition>
+    </mc:Fallback>
+  </mc:AlternateContent>
   <p:txStyles>
     <p:titleStyle>
       <a:lvl1pPr algn="l" defTabSz="457200" rtl="0" eaLnBrk="1" latinLnBrk="0" hangingPunct="1">
@@ -6164,9 +6368,18 @@
   <p:clrMapOvr>
     <a:masterClrMapping/>
   </p:clrMapOvr>
-  <p:transition spd="slow">
-    <p:push dir="u"/>
-  </p:transition>
+  <mc:AlternateContent xmlns:mc="http://schemas.openxmlformats.org/markup-compatibility/2006">
+    <mc:Choice xmlns:p159="http://schemas.microsoft.com/office/powerpoint/2015/09/main" Requires="p159">
+      <p:transition spd="slow" advTm="23">
+        <p159:morph option="byObject"/>
+      </p:transition>
+    </mc:Choice>
+    <mc:Fallback>
+      <p:transition spd="slow" advTm="23">
+        <p:fade/>
+      </p:transition>
+    </mc:Fallback>
+  </mc:AlternateContent>
   <p:timing>
     <p:tnLst>
       <p:par>
@@ -7079,14 +7292,14 @@
   <p:clrMapOvr>
     <a:masterClrMapping/>
   </p:clrMapOvr>
-  <mc:AlternateContent xmlns:mc="http://schemas.openxmlformats.org/markup-compatibility/2006" xmlns:p14="http://schemas.microsoft.com/office/powerpoint/2010/main">
-    <mc:Choice Requires="p14">
-      <p:transition spd="med" p14:dur="700">
-        <p:fade/>
+  <mc:AlternateContent xmlns:mc="http://schemas.openxmlformats.org/markup-compatibility/2006">
+    <mc:Choice xmlns:p159="http://schemas.microsoft.com/office/powerpoint/2015/09/main" Requires="p159">
+      <p:transition spd="slow" advTm="23">
+        <p159:morph option="byObject"/>
       </p:transition>
     </mc:Choice>
-    <mc:Fallback xmlns="">
-      <p:transition spd="med">
+    <mc:Fallback>
+      <p:transition spd="slow" advTm="23">
         <p:fade/>
       </p:transition>
     </mc:Fallback>
@@ -7733,9 +7946,18 @@
   <p:clrMapOvr>
     <a:masterClrMapping/>
   </p:clrMapOvr>
-  <p:transition spd="slow">
-    <p:randomBar dir="vert"/>
-  </p:transition>
+  <mc:AlternateContent xmlns:mc="http://schemas.openxmlformats.org/markup-compatibility/2006">
+    <mc:Choice xmlns:p159="http://schemas.microsoft.com/office/powerpoint/2015/09/main" Requires="p159">
+      <p:transition spd="slow" advTm="23">
+        <p159:morph option="byObject"/>
+      </p:transition>
+    </mc:Choice>
+    <mc:Fallback>
+      <p:transition spd="slow" advTm="23">
+        <p:fade/>
+      </p:transition>
+    </mc:Fallback>
+  </mc:AlternateContent>
   <p:timing>
     <p:tnLst>
       <p:par>
@@ -8319,8 +8541,8 @@
         </p:nvSpPr>
         <p:spPr>
           <a:xfrm>
-            <a:off x="878814" y="502740"/>
-            <a:ext cx="8193710" cy="2047923"/>
+            <a:off x="3785787" y="660871"/>
+            <a:ext cx="3119980" cy="2047923"/>
           </a:xfrm>
         </p:spPr>
         <p:txBody>
@@ -8328,10 +8550,10 @@
           <a:lstStyle/>
           <a:p>
             <a:r>
-              <a:rPr lang="pt-BR" dirty="0">
+              <a:rPr lang="pt-BR" sz="6000" dirty="0">
                 <a:latin typeface="Amasis MT Pro Medium" panose="02040604050005020304" pitchFamily="18" charset="0"/>
               </a:rPr>
-              <a:t>valores que acredito e confio</a:t>
+              <a:t>Valores</a:t>
             </a:r>
           </a:p>
         </p:txBody>
@@ -8364,6 +8586,10 @@
           </a:bodyPr>
           <a:lstStyle/>
           <a:p>
+            <a:pPr marL="457200" indent="-457200">
+              <a:buFont typeface="Arial" panose="020B0604020202020204" pitchFamily="34" charset="0"/>
+              <a:buChar char="•"/>
+            </a:pPr>
             <a:r>
               <a:rPr lang="pt-BR" sz="2800" dirty="0">
                 <a:solidFill>
@@ -8375,6 +8601,10 @@
             </a:r>
           </a:p>
           <a:p>
+            <a:pPr marL="457200" indent="-457200">
+              <a:buFont typeface="Arial" panose="020B0604020202020204" pitchFamily="34" charset="0"/>
+              <a:buChar char="•"/>
+            </a:pPr>
             <a:endParaRPr lang="pt-BR" sz="2800" dirty="0">
               <a:solidFill>
                 <a:schemeClr val="accent1"/>
@@ -8383,6 +8613,10 @@
             </a:endParaRPr>
           </a:p>
           <a:p>
+            <a:pPr marL="457200" indent="-457200">
+              <a:buFont typeface="Arial" panose="020B0604020202020204" pitchFamily="34" charset="0"/>
+              <a:buChar char="•"/>
+            </a:pPr>
             <a:endParaRPr lang="pt-BR" sz="2800" dirty="0">
               <a:solidFill>
                 <a:schemeClr val="accent1"/>
@@ -8420,6 +8654,10 @@
           </a:bodyPr>
           <a:lstStyle/>
           <a:p>
+            <a:pPr marL="457200" indent="-457200">
+              <a:buFont typeface="Arial" panose="020B0604020202020204" pitchFamily="34" charset="0"/>
+              <a:buChar char="•"/>
+            </a:pPr>
             <a:r>
               <a:rPr lang="pt-BR" sz="2800" b="0" i="0" dirty="0">
                 <a:solidFill>
@@ -8467,6 +8705,10 @@
           </a:bodyPr>
           <a:lstStyle/>
           <a:p>
+            <a:pPr marL="457200" indent="-457200">
+              <a:buFont typeface="Arial" panose="020B0604020202020204" pitchFamily="34" charset="0"/>
+              <a:buChar char="•"/>
+            </a:pPr>
             <a:r>
               <a:rPr lang="pt-BR" sz="2800" dirty="0">
                 <a:solidFill>
@@ -8489,14 +8731,14 @@
   <p:clrMapOvr>
     <a:masterClrMapping/>
   </p:clrMapOvr>
-  <mc:AlternateContent xmlns:mc="http://schemas.openxmlformats.org/markup-compatibility/2006" xmlns:p15="http://schemas.microsoft.com/office/powerpoint/2012/main">
-    <mc:Choice Requires="p15">
-      <p:transition xmlns:p14="http://schemas.microsoft.com/office/powerpoint/2010/main" spd="slow" p14:dur="3250">
-        <p15:prstTrans prst="origami"/>
+  <mc:AlternateContent xmlns:mc="http://schemas.openxmlformats.org/markup-compatibility/2006">
+    <mc:Choice xmlns:p159="http://schemas.microsoft.com/office/powerpoint/2015/09/main" Requires="p159">
+      <p:transition spd="slow" advTm="23">
+        <p159:morph option="byObject"/>
       </p:transition>
     </mc:Choice>
-    <mc:Fallback xmlns="">
-      <p:transition spd="slow">
+    <mc:Fallback>
+      <p:transition spd="slow" advTm="23">
         <p:fade/>
       </p:transition>
     </mc:Fallback>
@@ -9185,14 +9427,14 @@
   <p:clrMapOvr>
     <a:masterClrMapping/>
   </p:clrMapOvr>
-  <mc:AlternateContent xmlns:mc="http://schemas.openxmlformats.org/markup-compatibility/2006" xmlns:p14="http://schemas.microsoft.com/office/powerpoint/2010/main">
-    <mc:Choice Requires="p14">
-      <p:transition spd="slow" p14:dur="1400">
-        <p14:ripple/>
+  <mc:AlternateContent xmlns:mc="http://schemas.openxmlformats.org/markup-compatibility/2006">
+    <mc:Choice xmlns:p159="http://schemas.microsoft.com/office/powerpoint/2015/09/main" Requires="p159">
+      <p:transition spd="slow" advTm="23">
+        <p159:morph option="byObject"/>
       </p:transition>
     </mc:Choice>
-    <mc:Fallback xmlns="">
-      <p:transition spd="slow">
+    <mc:Fallback>
+      <p:transition spd="slow" advTm="23">
         <p:fade/>
       </p:transition>
     </mc:Fallback>
@@ -9931,14 +10173,14 @@
   <p:clrMapOvr>
     <a:masterClrMapping/>
   </p:clrMapOvr>
-  <mc:AlternateContent xmlns:mc="http://schemas.openxmlformats.org/markup-compatibility/2006" xmlns:p14="http://schemas.microsoft.com/office/powerpoint/2010/main">
-    <mc:Choice Requires="p14">
-      <p:transition spd="slow" p14:dur="1600">
-        <p14:prism isInverted="1"/>
+  <mc:AlternateContent xmlns:mc="http://schemas.openxmlformats.org/markup-compatibility/2006">
+    <mc:Choice xmlns:p159="http://schemas.microsoft.com/office/powerpoint/2015/09/main" Requires="p159">
+      <p:transition spd="slow" advTm="23">
+        <p159:morph option="byObject"/>
       </p:transition>
     </mc:Choice>
-    <mc:Fallback xmlns="">
-      <p:transition spd="slow">
+    <mc:Fallback>
+      <p:transition spd="slow" advTm="23">
         <p:fade/>
       </p:transition>
     </mc:Fallback>
@@ -10630,6 +10872,15 @@
 </file>
 
 <file path=customXml/item2.xml><?xml version="1.0" encoding="utf-8"?>
+<?mso-contentType ?>
+<FormTemplates xmlns="http://schemas.microsoft.com/sharepoint/v3/contenttype/forms">
+  <Display>DocumentLibraryForm</Display>
+  <Edit>DocumentLibraryForm</Edit>
+  <New>DocumentLibraryForm</New>
+</FormTemplates>
+</file>
+
+<file path=customXml/item3.xml><?xml version="1.0" encoding="utf-8"?>
 <ct:contentTypeSchema xmlns:ct="http://schemas.microsoft.com/office/2006/metadata/contentType" xmlns:ma="http://schemas.microsoft.com/office/2006/metadata/properties/metaAttributes" ct:_="" ma:_="" ma:contentTypeName="Document" ma:contentTypeID="0x01010009EF89933107E14B98DA3854C20B7ECD" ma:contentTypeVersion="12" ma:contentTypeDescription="Create a new document." ma:contentTypeScope="" ma:versionID="709490679d288e1d07454fa945457276">
   <xsd:schema xmlns:xsd="http://www.w3.org/2001/XMLSchema" xmlns:xs="http://www.w3.org/2001/XMLSchema" xmlns:p="http://schemas.microsoft.com/office/2006/metadata/properties" xmlns:ns3="745facbe-cf1f-4f63-a905-71b4bf945b82" xmlns:ns4="3ea074c8-3869-41b7-930f-9f3a245acc35" targetNamespace="http://schemas.microsoft.com/office/2006/metadata/properties" ma:root="true" ma:fieldsID="b061b65ac5a2f06445ce73bab7e4a671" ns3:_="" ns4:_="">
     <xsd:import namespace="745facbe-cf1f-4f63-a905-71b4bf945b82"/>
@@ -10844,15 +11095,6 @@
 </ct:contentTypeSchema>
 </file>
 
-<file path=customXml/item3.xml><?xml version="1.0" encoding="utf-8"?>
-<?mso-contentType ?>
-<FormTemplates xmlns="http://schemas.microsoft.com/sharepoint/v3/contenttype/forms">
-  <Display>DocumentLibraryForm</Display>
-  <Edit>DocumentLibraryForm</Edit>
-  <New>DocumentLibraryForm</New>
-</FormTemplates>
-</file>
-
 <file path=customXml/itemProps1.xml><?xml version="1.0" encoding="utf-8"?>
 <ds:datastoreItem xmlns:ds="http://schemas.openxmlformats.org/officeDocument/2006/customXml" ds:itemID="{7000B2BB-D83F-4EDF-B312-E8CA10624F26}">
   <ds:schemaRefs>
@@ -10871,6 +11113,14 @@
 </file>
 
 <file path=customXml/itemProps2.xml><?xml version="1.0" encoding="utf-8"?>
+<ds:datastoreItem xmlns:ds="http://schemas.openxmlformats.org/officeDocument/2006/customXml" ds:itemID="{92AF9BC1-EBFB-4112-94D2-5385CA8ABB8A}">
+  <ds:schemaRefs>
+    <ds:schemaRef ds:uri="http://schemas.microsoft.com/sharepoint/v3/contenttype/forms"/>
+  </ds:schemaRefs>
+</ds:datastoreItem>
+</file>
+
+<file path=customXml/itemProps3.xml><?xml version="1.0" encoding="utf-8"?>
 <ds:datastoreItem xmlns:ds="http://schemas.openxmlformats.org/officeDocument/2006/customXml" ds:itemID="{82192337-F789-4213-96D1-0539B3C69185}">
   <ds:schemaRefs>
     <ds:schemaRef ds:uri="http://schemas.microsoft.com/office/2006/metadata/contentType"/>
@@ -10887,12 +11137,4 @@
     <ds:schemaRef ds:uri="http://schemas.microsoft.com/internal/obd"/>
   </ds:schemaRefs>
 </ds:datastoreItem>
-</file>
-
-<file path=customXml/itemProps3.xml><?xml version="1.0" encoding="utf-8"?>
-<ds:datastoreItem xmlns:ds="http://schemas.openxmlformats.org/officeDocument/2006/customXml" ds:itemID="{92AF9BC1-EBFB-4112-94D2-5385CA8ABB8A}">
-  <ds:schemaRefs>
-    <ds:schemaRef ds:uri="http://schemas.microsoft.com/sharepoint/v3/contenttype/forms"/>
-  </ds:schemaRefs>
-</ds:datastoreItem>
 </file>
</xml_diff>